<commit_message>
Most likely final version of presentation; features trailer
</commit_message>
<xml_diff>
--- a/WPIn Love, Final Presentation.pptx
+++ b/WPIn Love, Final Presentation.pptx
@@ -249,6 +249,7 @@
           <a:p>
             <a:fld id="{4542878B-04CD-431E-A0A2-46A5E89BA354}" type="datetimeFigureOut">
               <a:rPr lang="en-US" smtClean="0"/>
+              <a:pPr/>
               <a:t>10/12/2015</a:t>
             </a:fld>
             <a:endParaRPr lang="en-US"/>
@@ -995,6 +996,7 @@
           <a:p>
             <a:fld id="{003B4593-4E20-443A-ACF3-4A31A2EB788B}" type="slidenum">
               <a:rPr lang="en-US" smtClean="0"/>
+              <a:pPr/>
               <a:t>‹#›</a:t>
             </a:fld>
             <a:endParaRPr lang="en-US"/>
@@ -1118,6 +1120,7 @@
           <a:p>
             <a:fld id="{4542878B-04CD-431E-A0A2-46A5E89BA354}" type="datetimeFigureOut">
               <a:rPr lang="en-US" smtClean="0"/>
+              <a:pPr/>
               <a:t>10/12/2015</a:t>
             </a:fld>
             <a:endParaRPr lang="en-US"/>
@@ -1160,6 +1163,7 @@
           <a:p>
             <a:fld id="{003B4593-4E20-443A-ACF3-4A31A2EB788B}" type="slidenum">
               <a:rPr lang="en-US" smtClean="0"/>
+              <a:pPr/>
               <a:t>‹#›</a:t>
             </a:fld>
             <a:endParaRPr lang="en-US"/>
@@ -1293,6 +1297,7 @@
           <a:p>
             <a:fld id="{4542878B-04CD-431E-A0A2-46A5E89BA354}" type="datetimeFigureOut">
               <a:rPr lang="en-US" smtClean="0"/>
+              <a:pPr/>
               <a:t>10/12/2015</a:t>
             </a:fld>
             <a:endParaRPr lang="en-US"/>
@@ -1335,6 +1340,7 @@
           <a:p>
             <a:fld id="{003B4593-4E20-443A-ACF3-4A31A2EB788B}" type="slidenum">
               <a:rPr lang="en-US" smtClean="0"/>
+              <a:pPr/>
               <a:t>‹#›</a:t>
             </a:fld>
             <a:endParaRPr lang="en-US"/>
@@ -1463,6 +1469,7 @@
           <a:p>
             <a:fld id="{4542878B-04CD-431E-A0A2-46A5E89BA354}" type="datetimeFigureOut">
               <a:rPr lang="en-US" smtClean="0"/>
+              <a:pPr/>
               <a:t>10/12/2015</a:t>
             </a:fld>
             <a:endParaRPr lang="en-US"/>
@@ -1486,6 +1493,7 @@
           <a:p>
             <a:fld id="{003B4593-4E20-443A-ACF3-4A31A2EB788B}" type="slidenum">
               <a:rPr lang="en-US" smtClean="0"/>
+              <a:pPr/>
               <a:t>‹#›</a:t>
             </a:fld>
             <a:endParaRPr lang="en-US"/>
@@ -1673,6 +1681,7 @@
           <a:p>
             <a:fld id="{4542878B-04CD-431E-A0A2-46A5E89BA354}" type="datetimeFigureOut">
               <a:rPr lang="en-US" smtClean="0"/>
+              <a:pPr/>
               <a:t>10/12/2015</a:t>
             </a:fld>
             <a:endParaRPr lang="en-US"/>
@@ -2416,6 +2425,7 @@
           <a:p>
             <a:fld id="{003B4593-4E20-443A-ACF3-4A31A2EB788B}" type="slidenum">
               <a:rPr lang="en-US" smtClean="0"/>
+              <a:pPr/>
               <a:t>‹#›</a:t>
             </a:fld>
             <a:endParaRPr lang="en-US"/>
@@ -2487,6 +2497,7 @@
           <a:p>
             <a:fld id="{4542878B-04CD-431E-A0A2-46A5E89BA354}" type="datetimeFigureOut">
               <a:rPr lang="en-US" smtClean="0"/>
+              <a:pPr/>
               <a:t>10/12/2015</a:t>
             </a:fld>
             <a:endParaRPr lang="en-US"/>
@@ -2529,6 +2540,7 @@
           <a:p>
             <a:fld id="{003B4593-4E20-443A-ACF3-4A31A2EB788B}" type="slidenum">
               <a:rPr lang="en-US" smtClean="0"/>
+              <a:pPr/>
               <a:t>‹#›</a:t>
             </a:fld>
             <a:endParaRPr lang="en-US"/>
@@ -2723,6 +2735,7 @@
           <a:p>
             <a:fld id="{4542878B-04CD-431E-A0A2-46A5E89BA354}" type="datetimeFigureOut">
               <a:rPr lang="en-US" smtClean="0"/>
+              <a:pPr/>
               <a:t>10/12/2015</a:t>
             </a:fld>
             <a:endParaRPr lang="en-US"/>
@@ -2765,6 +2778,7 @@
           <a:p>
             <a:fld id="{003B4593-4E20-443A-ACF3-4A31A2EB788B}" type="slidenum">
               <a:rPr lang="en-US" smtClean="0"/>
+              <a:pPr/>
               <a:t>‹#›</a:t>
             </a:fld>
             <a:endParaRPr lang="en-US"/>
@@ -3046,6 +3060,7 @@
           <a:p>
             <a:fld id="{4542878B-04CD-431E-A0A2-46A5E89BA354}" type="datetimeFigureOut">
               <a:rPr lang="en-US" smtClean="0"/>
+              <a:pPr/>
               <a:t>10/12/2015</a:t>
             </a:fld>
             <a:endParaRPr lang="en-US"/>
@@ -3069,6 +3084,7 @@
           <a:p>
             <a:fld id="{003B4593-4E20-443A-ACF3-4A31A2EB788B}" type="slidenum">
               <a:rPr lang="en-US" smtClean="0"/>
+              <a:pPr/>
               <a:t>‹#›</a:t>
             </a:fld>
             <a:endParaRPr lang="en-US"/>
@@ -3136,6 +3152,7 @@
           <a:p>
             <a:fld id="{4542878B-04CD-431E-A0A2-46A5E89BA354}" type="datetimeFigureOut">
               <a:rPr lang="en-US" smtClean="0"/>
+              <a:pPr/>
               <a:t>10/12/2015</a:t>
             </a:fld>
             <a:endParaRPr lang="en-US"/>
@@ -3178,6 +3195,7 @@
           <a:p>
             <a:fld id="{003B4593-4E20-443A-ACF3-4A31A2EB788B}" type="slidenum">
               <a:rPr lang="en-US" smtClean="0"/>
+              <a:pPr/>
               <a:t>‹#›</a:t>
             </a:fld>
             <a:endParaRPr lang="en-US"/>
@@ -3653,6 +3671,7 @@
           <a:p>
             <a:fld id="{4542878B-04CD-431E-A0A2-46A5E89BA354}" type="datetimeFigureOut">
               <a:rPr lang="en-US" smtClean="0"/>
+              <a:pPr/>
               <a:t>10/12/2015</a:t>
             </a:fld>
             <a:endParaRPr lang="en-US"/>
@@ -3676,6 +3695,7 @@
           <a:p>
             <a:fld id="{003B4593-4E20-443A-ACF3-4A31A2EB788B}" type="slidenum">
               <a:rPr lang="en-US" smtClean="0"/>
+              <a:pPr/>
               <a:t>‹#›</a:t>
             </a:fld>
             <a:endParaRPr lang="en-US"/>
@@ -4164,6 +4184,7 @@
           <a:p>
             <a:fld id="{4542878B-04CD-431E-A0A2-46A5E89BA354}" type="datetimeFigureOut">
               <a:rPr lang="en-US" smtClean="0"/>
+              <a:pPr/>
               <a:t>10/12/2015</a:t>
             </a:fld>
             <a:endParaRPr lang="en-US"/>
@@ -4187,6 +4208,7 @@
           <a:p>
             <a:fld id="{003B4593-4E20-443A-ACF3-4A31A2EB788B}" type="slidenum">
               <a:rPr lang="en-US" smtClean="0"/>
+              <a:pPr/>
               <a:t>‹#›</a:t>
             </a:fld>
             <a:endParaRPr lang="en-US"/>
@@ -4409,6 +4431,7 @@
           <a:p>
             <a:fld id="{4542878B-04CD-431E-A0A2-46A5E89BA354}" type="datetimeFigureOut">
               <a:rPr lang="en-US" smtClean="0"/>
+              <a:pPr/>
               <a:t>10/12/2015</a:t>
             </a:fld>
             <a:endParaRPr lang="en-US"/>
@@ -4685,6 +4708,7 @@
           <a:p>
             <a:fld id="{003B4593-4E20-443A-ACF3-4A31A2EB788B}" type="slidenum">
               <a:rPr lang="en-US" smtClean="0"/>
+              <a:pPr/>
               <a:t>‹#›</a:t>
             </a:fld>
             <a:endParaRPr lang="en-US"/>
@@ -5546,13 +5570,15 @@
               <a:rPr lang="en-US" sz="3600" dirty="0" smtClean="0">
                 <a:latin typeface="VAG Rounded" pitchFamily="34" charset="0"/>
               </a:rPr>
-              <a:t>Name </a:t>
-            </a:r>
+              <a:t>Name your characters! </a:t>
+            </a:r>
+          </a:p>
+          <a:p>
             <a:r>
               <a:rPr lang="en-US" sz="3600" dirty="0" smtClean="0">
                 <a:latin typeface="VAG Rounded" pitchFamily="34" charset="0"/>
               </a:rPr>
-              <a:t>your characters! </a:t>
+              <a:t>Choose your actions! </a:t>
             </a:r>
           </a:p>
           <a:p>
@@ -5560,13 +5586,15 @@
               <a:rPr lang="en-US" sz="3600" dirty="0" smtClean="0">
                 <a:latin typeface="VAG Rounded" pitchFamily="34" charset="0"/>
               </a:rPr>
-              <a:t>Choose </a:t>
-            </a:r>
+              <a:t>Unlock numerous endings depending on your choices! </a:t>
+            </a:r>
+          </a:p>
+          <a:p>
             <a:r>
               <a:rPr lang="en-US" sz="3600" dirty="0" smtClean="0">
                 <a:latin typeface="VAG Rounded" pitchFamily="34" charset="0"/>
               </a:rPr>
-              <a:t>your actions! </a:t>
+              <a:t>Beautiful scenes and artwork! </a:t>
             </a:r>
           </a:p>
           <a:p>
@@ -5574,41 +5602,7 @@
               <a:rPr lang="en-US" sz="3600" dirty="0" smtClean="0">
                 <a:latin typeface="VAG Rounded" pitchFamily="34" charset="0"/>
               </a:rPr>
-              <a:t>Unlock </a:t>
-            </a:r>
-            <a:r>
-              <a:rPr lang="en-US" sz="3600" dirty="0" smtClean="0">
-                <a:latin typeface="VAG Rounded" pitchFamily="34" charset="0"/>
-              </a:rPr>
-              <a:t>numerous endings depending on your choices! </a:t>
-            </a:r>
-          </a:p>
-          <a:p>
-            <a:r>
-              <a:rPr lang="en-US" sz="3600" dirty="0" smtClean="0">
-                <a:latin typeface="VAG Rounded" pitchFamily="34" charset="0"/>
-              </a:rPr>
-              <a:t>Beautiful </a:t>
-            </a:r>
-            <a:r>
-              <a:rPr lang="en-US" sz="3600" dirty="0" smtClean="0">
-                <a:latin typeface="VAG Rounded" pitchFamily="34" charset="0"/>
-              </a:rPr>
-              <a:t>scenes and artwork! </a:t>
-            </a:r>
-          </a:p>
-          <a:p>
-            <a:r>
-              <a:rPr lang="en-US" sz="3600" dirty="0" smtClean="0">
-                <a:latin typeface="VAG Rounded" pitchFamily="34" charset="0"/>
-              </a:rPr>
-              <a:t>Say </a:t>
-            </a:r>
-            <a:r>
-              <a:rPr lang="en-US" sz="3600" dirty="0" smtClean="0">
-                <a:latin typeface="VAG Rounded" pitchFamily="34" charset="0"/>
-              </a:rPr>
-              <a:t>and do the right things to win the girl! </a:t>
+              <a:t>Say and do the right things to win the girl! </a:t>
             </a:r>
           </a:p>
         </p:txBody>
@@ -5991,29 +5985,35 @@
           </a:p>
         </p:txBody>
       </p:sp>
-      <p:sp>
-        <p:nvSpPr>
-          <p:cNvPr id="3" name="Content Placeholder 2"/>
-          <p:cNvSpPr>
-            <a:spLocks noGrp="1"/>
-          </p:cNvSpPr>
+      <p:pic>
+        <p:nvPicPr>
+          <p:cNvPr id="4" name="WPIn Love Gameplay.avi">
+            <a:hlinkClick r:id="" action="ppaction://media"/>
+          </p:cNvPr>
+          <p:cNvPicPr>
+            <a:picLocks noGrp="1" noRot="1" noChangeAspect="1"/>
+          </p:cNvPicPr>
           <p:nvPr>
             <p:ph sz="quarter" idx="1"/>
-          </p:nvPr>
-        </p:nvSpPr>
-        <p:spPr/>
-        <p:txBody>
-          <a:bodyPr>
-            <a:normAutofit/>
-          </a:bodyPr>
-          <a:lstStyle/>
-          <a:p>
-            <a:endParaRPr lang="en-US" sz="3600" dirty="0">
-              <a:latin typeface="VAG Rounded" pitchFamily="34" charset="0"/>
-            </a:endParaRPr>
-          </a:p>
-        </p:txBody>
-      </p:sp>
+            <a:videoFile r:link="rId1"/>
+          </p:nvPr>
+        </p:nvPicPr>
+        <p:blipFill>
+          <a:blip r:embed="rId3" cstate="print"/>
+          <a:stretch>
+            <a:fillRect/>
+          </a:stretch>
+        </p:blipFill>
+        <p:spPr>
+          <a:xfrm>
+            <a:off x="-1524001" y="0"/>
+            <a:ext cx="12192001" cy="6858000"/>
+          </a:xfrm>
+          <a:prstGeom prst="rect">
+            <a:avLst/>
+          </a:prstGeom>
+        </p:spPr>
+      </p:pic>
     </p:spTree>
   </p:cSld>
   <p:clrMapOvr>
@@ -6022,7 +6022,150 @@
   <p:timing>
     <p:tnLst>
       <p:par>
-        <p:cTn id="1" dur="indefinite" restart="never" nodeType="tmRoot"/>
+        <p:cTn id="1" dur="indefinite" restart="never" nodeType="tmRoot">
+          <p:childTnLst>
+            <p:seq concurrent="1" nextAc="seek">
+              <p:cTn id="2" dur="indefinite" nodeType="mainSeq">
+                <p:childTnLst>
+                  <p:par>
+                    <p:cTn id="3" fill="hold">
+                      <p:stCondLst>
+                        <p:cond delay="indefinite"/>
+                        <p:cond evt="onBegin" delay="0">
+                          <p:tn val="2"/>
+                        </p:cond>
+                      </p:stCondLst>
+                      <p:childTnLst>
+                        <p:par>
+                          <p:cTn id="4" fill="hold">
+                            <p:stCondLst>
+                              <p:cond delay="0"/>
+                            </p:stCondLst>
+                            <p:childTnLst>
+                              <p:par>
+                                <p:cTn id="5" presetID="1" presetClass="mediacall" presetSubtype="0" fill="hold" nodeType="afterEffect">
+                                  <p:stCondLst>
+                                    <p:cond delay="0"/>
+                                  </p:stCondLst>
+                                  <p:childTnLst>
+                                    <p:cmd type="call" cmd="playFrom(0.0)">
+                                      <p:cBhvr>
+                                        <p:cTn id="6" dur="219849" fill="hold"/>
+                                        <p:tgtEl>
+                                          <p:spTgt spid="4"/>
+                                        </p:tgtEl>
+                                      </p:cBhvr>
+                                    </p:cmd>
+                                  </p:childTnLst>
+                                </p:cTn>
+                              </p:par>
+                            </p:childTnLst>
+                          </p:cTn>
+                        </p:par>
+                      </p:childTnLst>
+                    </p:cTn>
+                  </p:par>
+                </p:childTnLst>
+              </p:cTn>
+              <p:prevCondLst>
+                <p:cond evt="onPrev" delay="0">
+                  <p:tgtEl>
+                    <p:sldTgt/>
+                  </p:tgtEl>
+                </p:cond>
+              </p:prevCondLst>
+              <p:nextCondLst>
+                <p:cond evt="onNext" delay="0">
+                  <p:tgtEl>
+                    <p:sldTgt/>
+                  </p:tgtEl>
+                </p:cond>
+              </p:nextCondLst>
+            </p:seq>
+            <p:video>
+              <p:cMediaNode>
+                <p:cTn id="7" fill="hold" display="0">
+                  <p:stCondLst>
+                    <p:cond delay="indefinite"/>
+                  </p:stCondLst>
+                  <p:endCondLst>
+                    <p:cond evt="onNext" delay="0">
+                      <p:tgtEl>
+                        <p:sldTgt/>
+                      </p:tgtEl>
+                    </p:cond>
+                    <p:cond evt="onPrev" delay="0">
+                      <p:tgtEl>
+                        <p:sldTgt/>
+                      </p:tgtEl>
+                    </p:cond>
+                  </p:endCondLst>
+                </p:cTn>
+                <p:tgtEl>
+                  <p:spTgt spid="4"/>
+                </p:tgtEl>
+              </p:cMediaNode>
+            </p:video>
+            <p:seq concurrent="1" nextAc="seek">
+              <p:cTn id="8" restart="whenNotActive" fill="hold" evtFilter="cancelBubble" nodeType="interactiveSeq">
+                <p:stCondLst>
+                  <p:cond evt="onClick" delay="0">
+                    <p:tgtEl>
+                      <p:spTgt spid="4"/>
+                    </p:tgtEl>
+                  </p:cond>
+                </p:stCondLst>
+                <p:endSync evt="end" delay="0">
+                  <p:rtn val="all"/>
+                </p:endSync>
+                <p:childTnLst>
+                  <p:par>
+                    <p:cTn id="9" fill="hold">
+                      <p:stCondLst>
+                        <p:cond delay="0"/>
+                      </p:stCondLst>
+                      <p:childTnLst>
+                        <p:par>
+                          <p:cTn id="10" fill="hold">
+                            <p:stCondLst>
+                              <p:cond delay="0"/>
+                            </p:stCondLst>
+                            <p:childTnLst>
+                              <p:par>
+                                <p:cTn id="11" presetID="2" presetClass="mediacall" presetSubtype="0" fill="hold" nodeType="clickEffect">
+                                  <p:stCondLst>
+                                    <p:cond delay="0"/>
+                                  </p:stCondLst>
+                                  <p:childTnLst>
+                                    <p:cmd type="call" cmd="togglePause">
+                                      <p:cBhvr>
+                                        <p:cTn id="12" dur="1" fill="hold"/>
+                                        <p:tgtEl>
+                                          <p:spTgt spid="4"/>
+                                        </p:tgtEl>
+                                      </p:cBhvr>
+                                    </p:cmd>
+                                  </p:childTnLst>
+                                </p:cTn>
+                              </p:par>
+                            </p:childTnLst>
+                          </p:cTn>
+                        </p:par>
+                      </p:childTnLst>
+                    </p:cTn>
+                  </p:par>
+                </p:childTnLst>
+              </p:cTn>
+              <p:nextCondLst>
+                <p:cond evt="onClick" delay="0">
+                  <p:tgtEl>
+                    <p:spTgt spid="4"/>
+                  </p:tgtEl>
+                </p:cond>
+              </p:nextCondLst>
+            </p:seq>
+          </p:childTnLst>
+        </p:cTn>
       </p:par>
     </p:tnLst>
   </p:timing>

</xml_diff>

<commit_message>
Fixed spelling errors; used less obscure/more compatible font
</commit_message>
<xml_diff>
--- a/WPIn Love, Final Presentation.pptx
+++ b/WPIn Love, Final Presentation.pptx
@@ -5051,30 +5051,30 @@
         <p:spPr/>
         <p:txBody>
           <a:bodyPr>
-            <a:normAutofit/>
+            <a:normAutofit fontScale="90000"/>
           </a:bodyPr>
           <a:lstStyle/>
           <a:p>
             <a:r>
               <a:rPr lang="en-US" sz="9600" dirty="0" err="1" smtClean="0">
-                <a:latin typeface="VAG Rounded" pitchFamily="34" charset="0"/>
+                <a:latin typeface="Book Antiqua" pitchFamily="18" charset="0"/>
               </a:rPr>
               <a:t>WPI</a:t>
             </a:r>
             <a:r>
               <a:rPr lang="en-US" sz="9600" cap="none" dirty="0" err="1" smtClean="0">
-                <a:latin typeface="VAG Rounded" pitchFamily="34" charset="0"/>
+                <a:latin typeface="Book Antiqua" pitchFamily="18" charset="0"/>
               </a:rPr>
               <a:t>n</a:t>
             </a:r>
             <a:r>
               <a:rPr lang="en-US" sz="9600" cap="none" dirty="0" smtClean="0">
-                <a:latin typeface="VAG Rounded" pitchFamily="34" charset="0"/>
+                <a:latin typeface="Book Antiqua" pitchFamily="18" charset="0"/>
               </a:rPr>
               <a:t> Love</a:t>
             </a:r>
             <a:endParaRPr lang="en-US" sz="9600" dirty="0">
-              <a:latin typeface="VAG Rounded" pitchFamily="34" charset="0"/>
+              <a:latin typeface="Book Antiqua" pitchFamily="18" charset="0"/>
             </a:endParaRPr>
           </a:p>
         </p:txBody>
@@ -5099,12 +5099,12 @@
             <a:pPr algn="ctr"/>
             <a:r>
               <a:rPr lang="en-US" sz="3600" dirty="0" smtClean="0">
-                <a:latin typeface="VAG Rounded" pitchFamily="34" charset="0"/>
+                <a:latin typeface="Book Antiqua" pitchFamily="18" charset="0"/>
               </a:rPr>
               <a:t>by Spell Shaded</a:t>
             </a:r>
             <a:endParaRPr lang="en-US" sz="3600" dirty="0">
-              <a:latin typeface="VAG Rounded" pitchFamily="34" charset="0"/>
+              <a:latin typeface="Book Antiqua" pitchFamily="18" charset="0"/>
             </a:endParaRPr>
           </a:p>
         </p:txBody>
@@ -5162,9 +5162,7 @@
                 <a:effectLst/>
                 <a:uLnTx/>
                 <a:uFillTx/>
-                <a:latin typeface="VAG Rounded" pitchFamily="34" charset="0"/>
-                <a:ea typeface="+mn-ea"/>
-                <a:cs typeface="+mn-cs"/>
+                <a:latin typeface="Book Antiqua" pitchFamily="18" charset="0"/>
               </a:rPr>
               <a:t>Welcome to the storytelling</a:t>
             </a:r>
@@ -5179,9 +5177,7 @@
                 <a:effectLst/>
                 <a:uLnTx/>
                 <a:uFillTx/>
-                <a:latin typeface="VAG Rounded" pitchFamily="34" charset="0"/>
-                <a:ea typeface="+mn-ea"/>
-                <a:cs typeface="+mn-cs"/>
+                <a:latin typeface="Book Antiqua" pitchFamily="18" charset="0"/>
               </a:rPr>
               <a:t> experience of</a:t>
             </a:r>
@@ -5195,9 +5191,7 @@
               <a:effectLst/>
               <a:uLnTx/>
               <a:uFillTx/>
-              <a:latin typeface="VAG Rounded" pitchFamily="34" charset="0"/>
-              <a:ea typeface="+mn-ea"/>
-              <a:cs typeface="+mn-cs"/>
+              <a:latin typeface="Book Antiqua" pitchFamily="18" charset="0"/>
             </a:endParaRPr>
           </a:p>
         </p:txBody>
@@ -5247,18 +5241,18 @@
         <p:spPr/>
         <p:txBody>
           <a:bodyPr>
-            <a:normAutofit/>
+            <a:normAutofit fontScale="90000"/>
           </a:bodyPr>
           <a:lstStyle/>
           <a:p>
             <a:r>
               <a:rPr lang="en-US" sz="6600" cap="none" dirty="0" smtClean="0">
-                <a:latin typeface="VAG Rounded" pitchFamily="34" charset="0"/>
+                <a:latin typeface="Book Antiqua" pitchFamily="18" charset="0"/>
               </a:rPr>
               <a:t>Recap: Group Roles</a:t>
             </a:r>
             <a:endParaRPr lang="en-US" sz="6600" dirty="0">
-              <a:latin typeface="VAG Rounded" pitchFamily="34" charset="0"/>
+              <a:latin typeface="Book Antiqua" pitchFamily="18" charset="0"/>
             </a:endParaRPr>
           </a:p>
         </p:txBody>
@@ -5282,13 +5276,13 @@
           <a:p>
             <a:r>
               <a:rPr lang="en-US" sz="3600" dirty="0" err="1" smtClean="0">
-                <a:latin typeface="VAG Rounded" pitchFamily="34" charset="0"/>
+                <a:latin typeface="Book Antiqua" pitchFamily="18" charset="0"/>
               </a:rPr>
               <a:t>Jonella</a:t>
             </a:r>
             <a:r>
               <a:rPr lang="en-US" sz="3600" dirty="0" smtClean="0">
-                <a:latin typeface="VAG Rounded" pitchFamily="34" charset="0"/>
+                <a:latin typeface="Book Antiqua" pitchFamily="18" charset="0"/>
               </a:rPr>
               <a:t> Esposito, lead artist</a:t>
             </a:r>
@@ -5296,7 +5290,7 @@
           <a:p>
             <a:r>
               <a:rPr lang="en-US" sz="3600" dirty="0" smtClean="0">
-                <a:latin typeface="VAG Rounded" pitchFamily="34" charset="0"/>
+                <a:latin typeface="Book Antiqua" pitchFamily="18" charset="0"/>
               </a:rPr>
               <a:t>Griffin Cecil, lead designer</a:t>
             </a:r>
@@ -5304,7 +5298,7 @@
           <a:p>
             <a:r>
               <a:rPr lang="en-US" sz="3600" dirty="0" smtClean="0">
-                <a:latin typeface="VAG Rounded" pitchFamily="34" charset="0"/>
+                <a:latin typeface="Book Antiqua" pitchFamily="18" charset="0"/>
               </a:rPr>
               <a:t>Jimmy Tran, lead programmer</a:t>
             </a:r>
@@ -5312,24 +5306,24 @@
           <a:p>
             <a:r>
               <a:rPr lang="en-US" sz="3600" dirty="0" smtClean="0">
-                <a:latin typeface="VAG Rounded" pitchFamily="34" charset="0"/>
+                <a:latin typeface="Book Antiqua" pitchFamily="18" charset="0"/>
               </a:rPr>
               <a:t>Craig </a:t>
             </a:r>
             <a:r>
               <a:rPr lang="en-US" sz="3600" dirty="0" err="1" smtClean="0">
-                <a:latin typeface="VAG Rounded" pitchFamily="34" charset="0"/>
+                <a:latin typeface="Book Antiqua" pitchFamily="18" charset="0"/>
               </a:rPr>
               <a:t>Bursey</a:t>
             </a:r>
             <a:r>
               <a:rPr lang="en-US" sz="3600" dirty="0" smtClean="0">
-                <a:latin typeface="VAG Rounded" pitchFamily="34" charset="0"/>
+                <a:latin typeface="Book Antiqua" pitchFamily="18" charset="0"/>
               </a:rPr>
               <a:t>, designer/coder</a:t>
             </a:r>
             <a:endParaRPr lang="en-US" sz="3600" dirty="0">
-              <a:latin typeface="VAG Rounded" pitchFamily="34" charset="0"/>
+              <a:latin typeface="Book Antiqua" pitchFamily="18" charset="0"/>
             </a:endParaRPr>
           </a:p>
         </p:txBody>
@@ -5441,46 +5435,73 @@
           <a:p>
             <a:pPr algn="ctr"/>
             <a:r>
-              <a:rPr lang="en-US" sz="3600" dirty="0">
+              <a:rPr lang="en-US" sz="3600" b="1" dirty="0">
                 <a:solidFill>
                   <a:schemeClr val="tx1"/>
                 </a:solidFill>
-                <a:latin typeface="VAG Rounded" pitchFamily="34" charset="0"/>
+                <a:latin typeface="Book Antiqua" pitchFamily="18" charset="0"/>
               </a:rPr>
-              <a:t>We want our players to feel a sense of confusion and confliction with regards to the characters, as if they were actually making the </a:t>
+              <a:t>We want our players to feel a sense of confusion and </a:t>
+            </a:r>
+            <a:r>
+              <a:rPr lang="en-US" sz="3600" b="1" dirty="0" smtClean="0">
+                <a:solidFill>
+                  <a:schemeClr val="tx1"/>
+                </a:solidFill>
+                <a:latin typeface="Book Antiqua" pitchFamily="18" charset="0"/>
+              </a:rPr>
+              <a:t>conflict </a:t>
+            </a:r>
+            <a:r>
+              <a:rPr lang="en-US" sz="3600" b="1" dirty="0">
+                <a:solidFill>
+                  <a:schemeClr val="tx1"/>
+                </a:solidFill>
+                <a:latin typeface="Book Antiqua" pitchFamily="18" charset="0"/>
+              </a:rPr>
+              <a:t>with regards to the characters, as if they were actually making the </a:t>
+            </a:r>
+            <a:r>
+              <a:rPr lang="en-US" sz="3600" b="1" dirty="0" smtClean="0">
+                <a:solidFill>
+                  <a:schemeClr val="tx1"/>
+                </a:solidFill>
+                <a:latin typeface="Book Antiqua" pitchFamily="18" charset="0"/>
+              </a:rPr>
+              <a:t>decisions </a:t>
+            </a:r>
+            <a:r>
+              <a:rPr lang="en-US" sz="3600" b="1" dirty="0">
+                <a:solidFill>
+                  <a:schemeClr val="tx1"/>
+                </a:solidFill>
+                <a:latin typeface="Book Antiqua" pitchFamily="18" charset="0"/>
+              </a:rPr>
+              <a:t>in real </a:t>
+            </a:r>
+            <a:r>
+              <a:rPr lang="en-US" sz="3600" b="1" dirty="0" smtClean="0">
+                <a:solidFill>
+                  <a:schemeClr val="tx1"/>
+                </a:solidFill>
+                <a:latin typeface="Book Antiqua" pitchFamily="18" charset="0"/>
+              </a:rPr>
+              <a:t>life.</a:t>
             </a:r>
             <a:r>
               <a:rPr lang="en-US" sz="3600" dirty="0" smtClean="0">
                 <a:solidFill>
                   <a:schemeClr val="tx1"/>
                 </a:solidFill>
-                <a:latin typeface="VAG Rounded" pitchFamily="34" charset="0"/>
+                <a:latin typeface="Book Antiqua" pitchFamily="18" charset="0"/>
               </a:rPr>
-              <a:t>decisions </a:t>
-            </a:r>
-            <a:r>
-              <a:rPr lang="en-US" sz="3600" dirty="0">
-                <a:solidFill>
-                  <a:schemeClr val="tx1"/>
-                </a:solidFill>
-                <a:latin typeface="VAG Rounded" pitchFamily="34" charset="0"/>
-              </a:rPr>
-              <a:t>in real </a:t>
-            </a:r>
-            <a:r>
-              <a:rPr lang="en-US" sz="3600" dirty="0" smtClean="0">
-                <a:solidFill>
-                  <a:schemeClr val="tx1"/>
-                </a:solidFill>
-                <a:latin typeface="VAG Rounded" pitchFamily="34" charset="0"/>
-              </a:rPr>
-              <a:t>life. </a:t>
+              <a:t> </a:t>
             </a:r>
             <a:endParaRPr lang="en-US" sz="3600" dirty="0">
               <a:solidFill>
                 <a:schemeClr val="tx1"/>
               </a:solidFill>
-              <a:latin typeface="VAG Rounded" pitchFamily="34" charset="0"/>
+              <a:latin typeface="Book Antiqua" pitchFamily="18" charset="0"/>
             </a:endParaRPr>
           </a:p>
         </p:txBody>
@@ -5539,12 +5560,12 @@
           <a:p>
             <a:r>
               <a:rPr lang="en-US" sz="6600" cap="none" dirty="0" smtClean="0">
-                <a:latin typeface="VAG Rounded" pitchFamily="34" charset="0"/>
+                <a:latin typeface="Book Antiqua" pitchFamily="18" charset="0"/>
               </a:rPr>
               <a:t>Game Features</a:t>
             </a:r>
             <a:endParaRPr lang="en-US" sz="6600" dirty="0">
-              <a:latin typeface="VAG Rounded" pitchFamily="34" charset="0"/>
+              <a:latin typeface="Book Antiqua" pitchFamily="18" charset="0"/>
             </a:endParaRPr>
           </a:p>
         </p:txBody>
@@ -5568,7 +5589,7 @@
           <a:p>
             <a:r>
               <a:rPr lang="en-US" sz="3600" dirty="0" smtClean="0">
-                <a:latin typeface="VAG Rounded" pitchFamily="34" charset="0"/>
+                <a:latin typeface="Book Antiqua" pitchFamily="18" charset="0"/>
               </a:rPr>
               <a:t>Name your characters! </a:t>
             </a:r>
@@ -5576,7 +5597,7 @@
           <a:p>
             <a:r>
               <a:rPr lang="en-US" sz="3600" dirty="0" smtClean="0">
-                <a:latin typeface="VAG Rounded" pitchFamily="34" charset="0"/>
+                <a:latin typeface="Book Antiqua" pitchFamily="18" charset="0"/>
               </a:rPr>
               <a:t>Choose your actions! </a:t>
             </a:r>
@@ -5584,7 +5605,7 @@
           <a:p>
             <a:r>
               <a:rPr lang="en-US" sz="3600" dirty="0" smtClean="0">
-                <a:latin typeface="VAG Rounded" pitchFamily="34" charset="0"/>
+                <a:latin typeface="Book Antiqua" pitchFamily="18" charset="0"/>
               </a:rPr>
               <a:t>Unlock numerous endings depending on your choices! </a:t>
             </a:r>
@@ -5592,7 +5613,7 @@
           <a:p>
             <a:r>
               <a:rPr lang="en-US" sz="3600" dirty="0" smtClean="0">
-                <a:latin typeface="VAG Rounded" pitchFamily="34" charset="0"/>
+                <a:latin typeface="Book Antiqua" pitchFamily="18" charset="0"/>
               </a:rPr>
               <a:t>Beautiful scenes and artwork! </a:t>
             </a:r>
@@ -5600,7 +5621,7 @@
           <a:p>
             <a:r>
               <a:rPr lang="en-US" sz="3600" dirty="0" smtClean="0">
-                <a:latin typeface="VAG Rounded" pitchFamily="34" charset="0"/>
+                <a:latin typeface="Book Antiqua" pitchFamily="18" charset="0"/>
               </a:rPr>
               <a:t>Say and do the right things to win the girl! </a:t>
             </a:r>
@@ -5655,30 +5676,30 @@
         <p:spPr/>
         <p:txBody>
           <a:bodyPr>
-            <a:normAutofit/>
+            <a:normAutofit fontScale="90000"/>
           </a:bodyPr>
           <a:lstStyle/>
           <a:p>
             <a:r>
               <a:rPr lang="en-US" sz="9600" dirty="0" err="1" smtClean="0">
-                <a:latin typeface="VAG Rounded" pitchFamily="34" charset="0"/>
+                <a:latin typeface="Book Antiqua" pitchFamily="18" charset="0"/>
               </a:rPr>
               <a:t>WPI</a:t>
             </a:r>
             <a:r>
               <a:rPr lang="en-US" sz="9600" cap="none" dirty="0" err="1" smtClean="0">
-                <a:latin typeface="VAG Rounded" pitchFamily="34" charset="0"/>
+                <a:latin typeface="Book Antiqua" pitchFamily="18" charset="0"/>
               </a:rPr>
               <a:t>n</a:t>
             </a:r>
             <a:r>
               <a:rPr lang="en-US" sz="9600" cap="none" dirty="0" smtClean="0">
-                <a:latin typeface="VAG Rounded" pitchFamily="34" charset="0"/>
+                <a:latin typeface="Book Antiqua" pitchFamily="18" charset="0"/>
               </a:rPr>
               <a:t> Love</a:t>
             </a:r>
             <a:endParaRPr lang="en-US" sz="9600" dirty="0">
-              <a:latin typeface="VAG Rounded" pitchFamily="34" charset="0"/>
+              <a:latin typeface="Book Antiqua" pitchFamily="18" charset="0"/>
             </a:endParaRPr>
           </a:p>
         </p:txBody>
@@ -5702,7 +5723,7 @@
           <a:p>
             <a:pPr algn="ctr"/>
             <a:endParaRPr lang="en-US" sz="3600" dirty="0">
-              <a:latin typeface="VAG Rounded" pitchFamily="34" charset="0"/>
+              <a:latin typeface="Book Antiqua" pitchFamily="18" charset="0"/>
             </a:endParaRPr>
           </a:p>
         </p:txBody>
@@ -5760,9 +5781,7 @@
                 <a:effectLst/>
                 <a:uLnTx/>
                 <a:uFillTx/>
-                <a:latin typeface="VAG Rounded" pitchFamily="34" charset="0"/>
-                <a:ea typeface="+mn-ea"/>
-                <a:cs typeface="+mn-cs"/>
+                <a:latin typeface="Book Antiqua" pitchFamily="18" charset="0"/>
               </a:rPr>
               <a:t>Without further</a:t>
             </a:r>
@@ -5777,11 +5796,39 @@
                 <a:effectLst/>
                 <a:uLnTx/>
                 <a:uFillTx/>
-                <a:latin typeface="VAG Rounded" pitchFamily="34" charset="0"/>
-                <a:ea typeface="+mn-ea"/>
-                <a:cs typeface="+mn-cs"/>
+                <a:latin typeface="Book Antiqua" pitchFamily="18" charset="0"/>
               </a:rPr>
-              <a:t> adieu, we now present to you…</a:t>
+              <a:t> </a:t>
+            </a:r>
+            <a:r>
+              <a:rPr kumimoji="0" lang="en-US" sz="3600" b="1" i="0" u="none" strike="noStrike" kern="1200" cap="none" spc="0" normalizeH="0" noProof="0" dirty="0" smtClean="0">
+                <a:ln>
+                  <a:noFill/>
+                </a:ln>
+                <a:solidFill>
+                  <a:schemeClr val="tx2"/>
+                </a:solidFill>
+                <a:effectLst/>
+                <a:uLnTx/>
+                <a:uFillTx/>
+                <a:latin typeface="Book Antiqua" pitchFamily="18" charset="0"/>
+              </a:rPr>
+              <a:t>ado, </a:t>
+            </a:r>
+            <a:r>
+              <a:rPr kumimoji="0" lang="en-US" sz="3600" b="1" i="0" u="none" strike="noStrike" kern="1200" cap="none" spc="0" normalizeH="0" noProof="0" dirty="0" smtClean="0">
+                <a:ln>
+                  <a:noFill/>
+                </a:ln>
+                <a:solidFill>
+                  <a:schemeClr val="tx2"/>
+                </a:solidFill>
+                <a:effectLst/>
+                <a:uLnTx/>
+                <a:uFillTx/>
+                <a:latin typeface="Book Antiqua" pitchFamily="18" charset="0"/>
+              </a:rPr>
+              <a:t>we now present to you…</a:t>
             </a:r>
             <a:endParaRPr kumimoji="0" lang="en-US" sz="3600" b="1" i="0" u="none" strike="noStrike" kern="1200" cap="none" spc="0" normalizeH="0" baseline="0" noProof="0" dirty="0">
               <a:ln>
@@ -5793,9 +5840,7 @@
               <a:effectLst/>
               <a:uLnTx/>
               <a:uFillTx/>
-              <a:latin typeface="VAG Rounded" pitchFamily="34" charset="0"/>
-              <a:ea typeface="+mn-ea"/>
-              <a:cs typeface="+mn-cs"/>
+              <a:latin typeface="Book Antiqua" pitchFamily="18" charset="0"/>
             </a:endParaRPr>
           </a:p>
         </p:txBody>

</xml_diff>